<commit_message>
Improved readability of ModelDB slides
</commit_message>
<xml_diff>
--- a/Part_1_Resources_for_computational_modellers/5_Model_sharing/ModelDB.pptx
+++ b/Part_1_Resources_for_computational_modellers/5_Model_sharing/ModelDB.pptx
@@ -285,7 +285,7 @@
             <a:fld id="{350F7BB0-A51B-B744-B0B1-ADB6315F2149}" type="datetimeFigureOut">
               <a:rPr lang="en-US" altLang="x-none"/>
               <a:pPr/>
-              <a:t>6/26/2017</a:t>
+              <a:t>6/28/2017</a:t>
             </a:fld>
             <a:endParaRPr lang="en-US" altLang="x-none"/>
           </a:p>
@@ -468,7 +468,7 @@
               </a14:hiddenEffects>
             </a:ext>
             <a:ext uri="{FAA26D3D-D897-4be2-8F04-BA451C77F1D7}">
-              <ma14:placeholderFlag xmlns:ma14="http://schemas.microsoft.com/office/mac/drawingml/2011/main" xmlns="" val="1"/>
+              <ma14:placeholderFlag xmlns="" xmlns:ma14="http://schemas.microsoft.com/office/mac/drawingml/2011/main" val="1"/>
             </a:ext>
           </a:extLst>
         </p:spPr>
@@ -526,7 +526,7 @@
               </a14:hiddenEffects>
             </a:ext>
             <a:ext uri="{FAA26D3D-D897-4be2-8F04-BA451C77F1D7}">
-              <ma14:placeholderFlag xmlns:ma14="http://schemas.microsoft.com/office/mac/drawingml/2011/main" xmlns="" val="1"/>
+              <ma14:placeholderFlag xmlns="" xmlns:ma14="http://schemas.microsoft.com/office/mac/drawingml/2011/main" val="1"/>
             </a:ext>
           </a:extLst>
         </p:spPr>
@@ -596,7 +596,7 @@
               </a14:hiddenEffects>
             </a:ext>
             <a:ext uri="{FAA26D3D-D897-4be2-8F04-BA451C77F1D7}">
-              <ma14:placeholderFlag xmlns:ma14="http://schemas.microsoft.com/office/mac/drawingml/2011/main" xmlns="" val="1"/>
+              <ma14:placeholderFlag xmlns="" xmlns:ma14="http://schemas.microsoft.com/office/mac/drawingml/2011/main" val="1"/>
             </a:ext>
           </a:extLst>
         </p:spPr>
@@ -694,7 +694,7 @@
               </a14:hiddenEffects>
             </a:ext>
             <a:ext uri="{FAA26D3D-D897-4be2-8F04-BA451C77F1D7}">
-              <ma14:placeholderFlag xmlns:ma14="http://schemas.microsoft.com/office/mac/drawingml/2011/main" xmlns="" val="1"/>
+              <ma14:placeholderFlag xmlns="" xmlns:ma14="http://schemas.microsoft.com/office/mac/drawingml/2011/main" val="1"/>
             </a:ext>
           </a:extLst>
         </p:spPr>
@@ -792,7 +792,7 @@
               </a14:hiddenEffects>
             </a:ext>
             <a:ext uri="{FAA26D3D-D897-4be2-8F04-BA451C77F1D7}">
-              <ma14:placeholderFlag xmlns:ma14="http://schemas.microsoft.com/office/mac/drawingml/2011/main" xmlns="" val="1"/>
+              <ma14:placeholderFlag xmlns="" xmlns:ma14="http://schemas.microsoft.com/office/mac/drawingml/2011/main" val="1"/>
             </a:ext>
           </a:extLst>
         </p:spPr>
@@ -890,7 +890,7 @@
               </a14:hiddenEffects>
             </a:ext>
             <a:ext uri="{FAA26D3D-D897-4be2-8F04-BA451C77F1D7}">
-              <ma14:placeholderFlag xmlns:ma14="http://schemas.microsoft.com/office/mac/drawingml/2011/main" xmlns="" val="1"/>
+              <ma14:placeholderFlag xmlns="" xmlns:ma14="http://schemas.microsoft.com/office/mac/drawingml/2011/main" val="1"/>
             </a:ext>
           </a:extLst>
         </p:spPr>
@@ -5265,7 +5265,7 @@
               </a14:hiddenEffects>
             </a:ext>
             <a:ext uri="{FAA26D3D-D897-4be2-8F04-BA451C77F1D7}">
-              <ma14:placeholderFlag xmlns:ma14="http://schemas.microsoft.com/office/mac/drawingml/2011/main" xmlns="" val="1"/>
+              <ma14:placeholderFlag xmlns="" xmlns:ma14="http://schemas.microsoft.com/office/mac/drawingml/2011/main" val="1"/>
             </a:ext>
           </a:extLst>
         </p:spPr>
@@ -5338,7 +5338,7 @@
               </a14:hiddenEffects>
             </a:ext>
             <a:ext uri="{FAA26D3D-D897-4be2-8F04-BA451C77F1D7}">
-              <ma14:placeholderFlag xmlns:ma14="http://schemas.microsoft.com/office/mac/drawingml/2011/main" xmlns="" val="1"/>
+              <ma14:placeholderFlag xmlns="" xmlns:ma14="http://schemas.microsoft.com/office/mac/drawingml/2011/main" val="1"/>
             </a:ext>
           </a:extLst>
         </p:spPr>
@@ -5453,7 +5453,7 @@
               </a14:hiddenEffects>
             </a:ext>
             <a:ext uri="{FAA26D3D-D897-4be2-8F04-BA451C77F1D7}">
-              <ma14:placeholderFlag xmlns:ma14="http://schemas.microsoft.com/office/mac/drawingml/2011/main" xmlns="" val="1"/>
+              <ma14:placeholderFlag xmlns="" xmlns:ma14="http://schemas.microsoft.com/office/mac/drawingml/2011/main" val="1"/>
             </a:ext>
           </a:extLst>
         </p:spPr>
@@ -5549,7 +5549,7 @@
               </a14:hiddenEffects>
             </a:ext>
             <a:ext uri="{FAA26D3D-D897-4be2-8F04-BA451C77F1D7}">
-              <ma14:placeholderFlag xmlns:ma14="http://schemas.microsoft.com/office/mac/drawingml/2011/main" xmlns="" val="1"/>
+              <ma14:placeholderFlag xmlns="" xmlns:ma14="http://schemas.microsoft.com/office/mac/drawingml/2011/main" val="1"/>
             </a:ext>
           </a:extLst>
         </p:spPr>
@@ -5647,7 +5647,7 @@
               </a14:hiddenEffects>
             </a:ext>
             <a:ext uri="{FAA26D3D-D897-4be2-8F04-BA451C77F1D7}">
-              <ma14:placeholderFlag xmlns:ma14="http://schemas.microsoft.com/office/mac/drawingml/2011/main" xmlns="" val="1"/>
+              <ma14:placeholderFlag xmlns="" xmlns:ma14="http://schemas.microsoft.com/office/mac/drawingml/2011/main" val="1"/>
             </a:ext>
           </a:extLst>
         </p:spPr>
@@ -6352,13 +6352,8 @@
             </a:pPr>
             <a:r>
               <a:rPr lang="en-GB" altLang="x-none" dirty="0" smtClean="0"/>
-              <a:t>http</a:t>
-            </a:r>
-            <a:r>
-              <a:rPr lang="en-GB" altLang="x-none" dirty="0" smtClean="0"/>
-              <a:t>://modeldb.yale.edu</a:t>
-            </a:r>
-            <a:endParaRPr lang="en-GB" altLang="x-none" dirty="0" smtClean="0"/>
+              <a:t>http://modeldb.yale.edu</a:t>
+            </a:r>
           </a:p>
         </p:txBody>
       </p:sp>
@@ -7709,9 +7704,39 @@
           <a:chExt cx="0" cy="0"/>
         </a:xfrm>
       </p:grpSpPr>
+      <p:pic>
+        <p:nvPicPr>
+          <p:cNvPr id="2" name="Picture 1"/>
+          <p:cNvPicPr>
+            <a:picLocks noChangeAspect="1"/>
+          </p:cNvPicPr>
+          <p:nvPr/>
+        </p:nvPicPr>
+        <p:blipFill>
+          <a:blip r:embed="rId3">
+            <a:extLst>
+              <a:ext uri="{28A0092B-C50C-407E-A947-70E740481C1C}">
+                <a14:useLocalDpi xmlns:a14="http://schemas.microsoft.com/office/drawing/2010/main" val="0"/>
+              </a:ext>
+            </a:extLst>
+          </a:blip>
+          <a:stretch>
+            <a:fillRect/>
+          </a:stretch>
+        </p:blipFill>
+        <p:spPr>
+          <a:xfrm>
+            <a:off x="0" y="251445"/>
+            <a:ext cx="10080625" cy="5584666"/>
+          </a:xfrm>
+          <a:prstGeom prst="rect">
+            <a:avLst/>
+          </a:prstGeom>
+        </p:spPr>
+      </p:pic>
       <p:sp>
         <p:nvSpPr>
-          <p:cNvPr id="4097" name="Text Box 1"/>
+          <p:cNvPr id="4" name="Text Box 1"/>
           <p:cNvSpPr txBox="1">
             <a:spLocks noChangeArrowheads="1"/>
           </p:cNvSpPr>
@@ -7719,7 +7744,7 @@
         </p:nvSpPr>
         <p:spPr bwMode="auto">
           <a:xfrm>
-            <a:off x="739774" y="693738"/>
+            <a:off x="693799" y="6156101"/>
             <a:ext cx="8693025" cy="1250950"/>
           </a:xfrm>
           <a:prstGeom prst="rect">
@@ -8017,7 +8042,7 @@
             <a:r>
               <a:rPr lang="en-GB" altLang="x-none" i="1" dirty="0" smtClean="0">
                 <a:solidFill>
-                  <a:srgbClr val="666666"/>
+                  <a:schemeClr val="tx1"/>
                 </a:solidFill>
               </a:rPr>
               <a:t>Over 1200 models · 76 </a:t>
@@ -8025,7 +8050,7 @@
             <a:r>
               <a:rPr lang="en-GB" altLang="x-none" i="1" dirty="0">
                 <a:solidFill>
-                  <a:srgbClr val="666666"/>
+                  <a:schemeClr val="tx1"/>
                 </a:solidFill>
               </a:rPr>
               <a:t>simulation environments · </a:t>
@@ -8033,7 +8058,7 @@
             <a:r>
               <a:rPr lang="en-GB" altLang="x-none" i="1" dirty="0" smtClean="0">
                 <a:solidFill>
-                  <a:srgbClr val="666666"/>
+                  <a:schemeClr val="tx1"/>
                 </a:solidFill>
               </a:rPr>
               <a:t>178 cell types</a:t>
@@ -8041,7 +8066,7 @@
             <a:r>
               <a:rPr lang="en-GB" altLang="x-none" i="1" dirty="0">
                 <a:solidFill>
-                  <a:srgbClr val="666666"/>
+                  <a:schemeClr val="tx1"/>
                 </a:solidFill>
               </a:rPr>
               <a:t> · </a:t>
@@ -8049,7 +8074,7 @@
             <a:r>
               <a:rPr lang="en-GB" altLang="x-none" i="1" dirty="0" smtClean="0">
                 <a:solidFill>
-                  <a:srgbClr val="666666"/>
+                  <a:schemeClr val="tx1"/>
                 </a:solidFill>
               </a:rPr>
               <a:t>145 topics (Alzheimer’s, STDP, </a:t>
@@ -8057,7 +8082,7 @@
             <a:r>
               <a:rPr lang="en-GB" altLang="x-none" i="1" dirty="0" err="1" smtClean="0">
                 <a:solidFill>
-                  <a:srgbClr val="666666"/>
+                  <a:schemeClr val="tx1"/>
                 </a:solidFill>
               </a:rPr>
               <a:t>etc</a:t>
@@ -8065,7 +8090,7 @@
             <a:r>
               <a:rPr lang="en-GB" altLang="x-none" i="1" dirty="0" smtClean="0">
                 <a:solidFill>
-                  <a:srgbClr val="666666"/>
+                  <a:schemeClr val="tx1"/>
                 </a:solidFill>
               </a:rPr>
               <a:t>) </a:t>
@@ -8073,7 +8098,7 @@
             <a:r>
               <a:rPr lang="en-GB" altLang="x-none" i="1" dirty="0">
                 <a:solidFill>
-                  <a:srgbClr val="666666"/>
+                  <a:schemeClr val="tx1"/>
                 </a:solidFill>
               </a:rPr>
               <a:t>· </a:t>
@@ -8081,7 +8106,7 @@
             <a:r>
               <a:rPr lang="en-GB" altLang="x-none" i="1" dirty="0" smtClean="0">
                 <a:solidFill>
-                  <a:srgbClr val="666666"/>
+                  <a:schemeClr val="tx1"/>
                 </a:solidFill>
               </a:rPr>
               <a:t>16+ species</a:t>
@@ -8089,7 +8114,7 @@
             <a:r>
               <a:rPr lang="en-GB" altLang="x-none" i="1" dirty="0">
                 <a:solidFill>
-                  <a:srgbClr val="666666"/>
+                  <a:schemeClr val="tx1"/>
                 </a:solidFill>
               </a:rPr>
               <a:t> · </a:t>
@@ -8097,7 +8122,7 @@
             <a:r>
               <a:rPr lang="en-GB" altLang="x-none" i="1" dirty="0" smtClean="0">
                 <a:solidFill>
-                  <a:srgbClr val="666666"/>
+                  <a:schemeClr val="tx1"/>
                 </a:solidFill>
               </a:rPr>
               <a:t>54 ion channels, pumps, </a:t>
@@ -8105,7 +8130,7 @@
             <a:r>
               <a:rPr lang="en-GB" altLang="x-none" i="1" dirty="0" err="1" smtClean="0">
                 <a:solidFill>
-                  <a:srgbClr val="666666"/>
+                  <a:schemeClr val="tx1"/>
                 </a:solidFill>
               </a:rPr>
               <a:t>etc</a:t>
@@ -8113,7 +8138,7 @@
             <a:r>
               <a:rPr lang="en-GB" altLang="x-none" i="1" dirty="0" smtClean="0">
                 <a:solidFill>
-                  <a:srgbClr val="666666"/>
+                  <a:schemeClr val="tx1"/>
                 </a:solidFill>
               </a:rPr>
               <a:t> </a:t>
@@ -8121,14 +8146,14 @@
             <a:r>
               <a:rPr lang="en-GB" altLang="x-none" i="1" dirty="0">
                 <a:solidFill>
-                  <a:srgbClr val="666666"/>
+                  <a:schemeClr val="tx1"/>
                 </a:solidFill>
               </a:rPr>
               <a:t> · </a:t>
             </a:r>
             <a:endParaRPr lang="en-GB" altLang="x-none" i="1" dirty="0" smtClean="0">
               <a:solidFill>
-                <a:srgbClr val="666666"/>
+                <a:schemeClr val="tx1"/>
               </a:solidFill>
             </a:endParaRPr>
           </a:p>
@@ -8148,498 +8173,11 @@
             <a:r>
               <a:rPr lang="en-GB" altLang="x-none" i="1" dirty="0" smtClean="0">
                 <a:solidFill>
-                  <a:srgbClr val="666666"/>
+                  <a:schemeClr val="tx1"/>
                 </a:solidFill>
               </a:rPr>
               <a:t>24+ mammalian brain regions</a:t>
             </a:r>
-            <a:endParaRPr lang="en-GB" altLang="x-none" i="1" dirty="0" smtClean="0">
-              <a:solidFill>
-                <a:srgbClr val="666666"/>
-              </a:solidFill>
-            </a:endParaRPr>
-          </a:p>
-        </p:txBody>
-      </p:sp>
-      <p:pic>
-        <p:nvPicPr>
-          <p:cNvPr id="2" name="Picture 1"/>
-          <p:cNvPicPr>
-            <a:picLocks noChangeAspect="1"/>
-          </p:cNvPicPr>
-          <p:nvPr/>
-        </p:nvPicPr>
-        <p:blipFill>
-          <a:blip r:embed="rId3">
-            <a:extLst>
-              <a:ext uri="{28A0092B-C50C-407E-A947-70E740481C1C}">
-                <a14:useLocalDpi xmlns:a14="http://schemas.microsoft.com/office/drawing/2010/main" val="0"/>
-              </a:ext>
-            </a:extLst>
-          </a:blip>
-          <a:stretch>
-            <a:fillRect/>
-          </a:stretch>
-        </p:blipFill>
-        <p:spPr>
-          <a:xfrm>
-            <a:off x="0" y="323453"/>
-            <a:ext cx="10080625" cy="5584666"/>
-          </a:xfrm>
-          <a:prstGeom prst="rect">
-            <a:avLst/>
-          </a:prstGeom>
-        </p:spPr>
-      </p:pic>
-      <p:sp>
-        <p:nvSpPr>
-          <p:cNvPr id="4" name="Text Box 1"/>
-          <p:cNvSpPr txBox="1">
-            <a:spLocks noChangeArrowheads="1"/>
-          </p:cNvSpPr>
-          <p:nvPr/>
-        </p:nvSpPr>
-        <p:spPr bwMode="auto">
-          <a:xfrm>
-            <a:off x="693799" y="6156101"/>
-            <a:ext cx="8693025" cy="1250950"/>
-          </a:xfrm>
-          <a:prstGeom prst="rect">
-            <a:avLst/>
-          </a:prstGeom>
-          <a:noFill/>
-          <a:ln>
-            <a:noFill/>
-          </a:ln>
-          <a:effectLst/>
-          <a:extLst>
-            <a:ext uri="{909E8E84-426E-40DD-AFC4-6F175D3DCCD1}">
-              <a14:hiddenFill xmlns:a14="http://schemas.microsoft.com/office/drawing/2010/main">
-                <a:solidFill>
-                  <a:srgbClr val="FFFFFF"/>
-                </a:solidFill>
-              </a14:hiddenFill>
-            </a:ext>
-            <a:ext uri="{91240B29-F687-4F45-9708-019B960494DF}">
-              <a14:hiddenLine xmlns:a14="http://schemas.microsoft.com/office/drawing/2010/main" w="9525" cap="flat">
-                <a:solidFill>
-                  <a:srgbClr val="000000"/>
-                </a:solidFill>
-                <a:round/>
-                <a:headEnd/>
-                <a:tailEnd/>
-              </a14:hiddenLine>
-            </a:ext>
-            <a:ext uri="{AF507438-7753-43E0-B8FC-AC1667EBCBE1}">
-              <a14:hiddenEffects xmlns:a14="http://schemas.microsoft.com/office/drawing/2010/main">
-                <a:effectLst>
-                  <a:outerShdw blurRad="63500" dist="38099" dir="2700000" algn="ctr" rotWithShape="0">
-                    <a:srgbClr val="000000">
-                      <a:alpha val="74998"/>
-                    </a:srgbClr>
-                  </a:outerShdw>
-                </a:effectLst>
-              </a14:hiddenEffects>
-            </a:ext>
-          </a:extLst>
-        </p:spPr>
-        <p:txBody>
-          <a:bodyPr lIns="90000" tIns="61002" rIns="90000" bIns="45000"/>
-          <a:lstStyle>
-            <a:lvl1pPr>
-              <a:tabLst>
-                <a:tab pos="449263" algn="l"/>
-                <a:tab pos="898525" algn="l"/>
-                <a:tab pos="1347788" algn="l"/>
-                <a:tab pos="1797050" algn="l"/>
-                <a:tab pos="2246313" algn="l"/>
-                <a:tab pos="2695575" algn="l"/>
-                <a:tab pos="3144838" algn="l"/>
-                <a:tab pos="3594100" algn="l"/>
-              </a:tabLst>
-              <a:defRPr>
-                <a:solidFill>
-                  <a:srgbClr val="000000"/>
-                </a:solidFill>
-                <a:latin typeface="Arial" charset="0"/>
-                <a:ea typeface="Noto Sans CJK SC Regular" charset="0"/>
-                <a:cs typeface="Noto Sans CJK SC Regular" charset="0"/>
-              </a:defRPr>
-            </a:lvl1pPr>
-            <a:lvl2pPr>
-              <a:tabLst>
-                <a:tab pos="449263" algn="l"/>
-                <a:tab pos="898525" algn="l"/>
-                <a:tab pos="1347788" algn="l"/>
-                <a:tab pos="1797050" algn="l"/>
-                <a:tab pos="2246313" algn="l"/>
-                <a:tab pos="2695575" algn="l"/>
-                <a:tab pos="3144838" algn="l"/>
-                <a:tab pos="3594100" algn="l"/>
-              </a:tabLst>
-              <a:defRPr>
-                <a:solidFill>
-                  <a:srgbClr val="000000"/>
-                </a:solidFill>
-                <a:latin typeface="Arial" charset="0"/>
-                <a:ea typeface="Noto Sans CJK SC Regular" charset="0"/>
-                <a:cs typeface="Noto Sans CJK SC Regular" charset="0"/>
-              </a:defRPr>
-            </a:lvl2pPr>
-            <a:lvl3pPr>
-              <a:tabLst>
-                <a:tab pos="449263" algn="l"/>
-                <a:tab pos="898525" algn="l"/>
-                <a:tab pos="1347788" algn="l"/>
-                <a:tab pos="1797050" algn="l"/>
-                <a:tab pos="2246313" algn="l"/>
-                <a:tab pos="2695575" algn="l"/>
-                <a:tab pos="3144838" algn="l"/>
-                <a:tab pos="3594100" algn="l"/>
-              </a:tabLst>
-              <a:defRPr>
-                <a:solidFill>
-                  <a:srgbClr val="000000"/>
-                </a:solidFill>
-                <a:latin typeface="Arial" charset="0"/>
-                <a:ea typeface="Noto Sans CJK SC Regular" charset="0"/>
-                <a:cs typeface="Noto Sans CJK SC Regular" charset="0"/>
-              </a:defRPr>
-            </a:lvl3pPr>
-            <a:lvl4pPr>
-              <a:tabLst>
-                <a:tab pos="449263" algn="l"/>
-                <a:tab pos="898525" algn="l"/>
-                <a:tab pos="1347788" algn="l"/>
-                <a:tab pos="1797050" algn="l"/>
-                <a:tab pos="2246313" algn="l"/>
-                <a:tab pos="2695575" algn="l"/>
-                <a:tab pos="3144838" algn="l"/>
-                <a:tab pos="3594100" algn="l"/>
-              </a:tabLst>
-              <a:defRPr>
-                <a:solidFill>
-                  <a:srgbClr val="000000"/>
-                </a:solidFill>
-                <a:latin typeface="Arial" charset="0"/>
-                <a:ea typeface="Noto Sans CJK SC Regular" charset="0"/>
-                <a:cs typeface="Noto Sans CJK SC Regular" charset="0"/>
-              </a:defRPr>
-            </a:lvl4pPr>
-            <a:lvl5pPr>
-              <a:tabLst>
-                <a:tab pos="449263" algn="l"/>
-                <a:tab pos="898525" algn="l"/>
-                <a:tab pos="1347788" algn="l"/>
-                <a:tab pos="1797050" algn="l"/>
-                <a:tab pos="2246313" algn="l"/>
-                <a:tab pos="2695575" algn="l"/>
-                <a:tab pos="3144838" algn="l"/>
-                <a:tab pos="3594100" algn="l"/>
-              </a:tabLst>
-              <a:defRPr>
-                <a:solidFill>
-                  <a:srgbClr val="000000"/>
-                </a:solidFill>
-                <a:latin typeface="Arial" charset="0"/>
-                <a:ea typeface="Noto Sans CJK SC Regular" charset="0"/>
-                <a:cs typeface="Noto Sans CJK SC Regular" charset="0"/>
-              </a:defRPr>
-            </a:lvl5pPr>
-            <a:lvl6pPr marL="2514600" indent="-228600" defTabSz="449263" fontAlgn="base" hangingPunct="0">
-              <a:lnSpc>
-                <a:spcPct val="93000"/>
-              </a:lnSpc>
-              <a:spcBef>
-                <a:spcPct val="0"/>
-              </a:spcBef>
-              <a:spcAft>
-                <a:spcPct val="0"/>
-              </a:spcAft>
-              <a:buClr>
-                <a:srgbClr val="000000"/>
-              </a:buClr>
-              <a:buSzPct val="100000"/>
-              <a:buFont typeface="Times New Roman" charset="0"/>
-              <a:tabLst>
-                <a:tab pos="449263" algn="l"/>
-                <a:tab pos="898525" algn="l"/>
-                <a:tab pos="1347788" algn="l"/>
-                <a:tab pos="1797050" algn="l"/>
-                <a:tab pos="2246313" algn="l"/>
-                <a:tab pos="2695575" algn="l"/>
-                <a:tab pos="3144838" algn="l"/>
-                <a:tab pos="3594100" algn="l"/>
-              </a:tabLst>
-              <a:defRPr>
-                <a:solidFill>
-                  <a:srgbClr val="000000"/>
-                </a:solidFill>
-                <a:latin typeface="Arial" charset="0"/>
-                <a:ea typeface="Noto Sans CJK SC Regular" charset="0"/>
-                <a:cs typeface="Noto Sans CJK SC Regular" charset="0"/>
-              </a:defRPr>
-            </a:lvl6pPr>
-            <a:lvl7pPr marL="2971800" indent="-228600" defTabSz="449263" fontAlgn="base" hangingPunct="0">
-              <a:lnSpc>
-                <a:spcPct val="93000"/>
-              </a:lnSpc>
-              <a:spcBef>
-                <a:spcPct val="0"/>
-              </a:spcBef>
-              <a:spcAft>
-                <a:spcPct val="0"/>
-              </a:spcAft>
-              <a:buClr>
-                <a:srgbClr val="000000"/>
-              </a:buClr>
-              <a:buSzPct val="100000"/>
-              <a:buFont typeface="Times New Roman" charset="0"/>
-              <a:tabLst>
-                <a:tab pos="449263" algn="l"/>
-                <a:tab pos="898525" algn="l"/>
-                <a:tab pos="1347788" algn="l"/>
-                <a:tab pos="1797050" algn="l"/>
-                <a:tab pos="2246313" algn="l"/>
-                <a:tab pos="2695575" algn="l"/>
-                <a:tab pos="3144838" algn="l"/>
-                <a:tab pos="3594100" algn="l"/>
-              </a:tabLst>
-              <a:defRPr>
-                <a:solidFill>
-                  <a:srgbClr val="000000"/>
-                </a:solidFill>
-                <a:latin typeface="Arial" charset="0"/>
-                <a:ea typeface="Noto Sans CJK SC Regular" charset="0"/>
-                <a:cs typeface="Noto Sans CJK SC Regular" charset="0"/>
-              </a:defRPr>
-            </a:lvl7pPr>
-            <a:lvl8pPr marL="3429000" indent="-228600" defTabSz="449263" fontAlgn="base" hangingPunct="0">
-              <a:lnSpc>
-                <a:spcPct val="93000"/>
-              </a:lnSpc>
-              <a:spcBef>
-                <a:spcPct val="0"/>
-              </a:spcBef>
-              <a:spcAft>
-                <a:spcPct val="0"/>
-              </a:spcAft>
-              <a:buClr>
-                <a:srgbClr val="000000"/>
-              </a:buClr>
-              <a:buSzPct val="100000"/>
-              <a:buFont typeface="Times New Roman" charset="0"/>
-              <a:tabLst>
-                <a:tab pos="449263" algn="l"/>
-                <a:tab pos="898525" algn="l"/>
-                <a:tab pos="1347788" algn="l"/>
-                <a:tab pos="1797050" algn="l"/>
-                <a:tab pos="2246313" algn="l"/>
-                <a:tab pos="2695575" algn="l"/>
-                <a:tab pos="3144838" algn="l"/>
-                <a:tab pos="3594100" algn="l"/>
-              </a:tabLst>
-              <a:defRPr>
-                <a:solidFill>
-                  <a:srgbClr val="000000"/>
-                </a:solidFill>
-                <a:latin typeface="Arial" charset="0"/>
-                <a:ea typeface="Noto Sans CJK SC Regular" charset="0"/>
-                <a:cs typeface="Noto Sans CJK SC Regular" charset="0"/>
-              </a:defRPr>
-            </a:lvl8pPr>
-            <a:lvl9pPr marL="3886200" indent="-228600" defTabSz="449263" fontAlgn="base" hangingPunct="0">
-              <a:lnSpc>
-                <a:spcPct val="93000"/>
-              </a:lnSpc>
-              <a:spcBef>
-                <a:spcPct val="0"/>
-              </a:spcBef>
-              <a:spcAft>
-                <a:spcPct val="0"/>
-              </a:spcAft>
-              <a:buClr>
-                <a:srgbClr val="000000"/>
-              </a:buClr>
-              <a:buSzPct val="100000"/>
-              <a:buFont typeface="Times New Roman" charset="0"/>
-              <a:tabLst>
-                <a:tab pos="449263" algn="l"/>
-                <a:tab pos="898525" algn="l"/>
-                <a:tab pos="1347788" algn="l"/>
-                <a:tab pos="1797050" algn="l"/>
-                <a:tab pos="2246313" algn="l"/>
-                <a:tab pos="2695575" algn="l"/>
-                <a:tab pos="3144838" algn="l"/>
-                <a:tab pos="3594100" algn="l"/>
-              </a:tabLst>
-              <a:defRPr>
-                <a:solidFill>
-                  <a:srgbClr val="000000"/>
-                </a:solidFill>
-                <a:latin typeface="Arial" charset="0"/>
-                <a:ea typeface="Noto Sans CJK SC Regular" charset="0"/>
-                <a:cs typeface="Noto Sans CJK SC Regular" charset="0"/>
-              </a:defRPr>
-            </a:lvl9pPr>
-          </a:lstStyle>
-          <a:p>
-            <a:pPr algn="ctr" eaLnBrk="1">
-              <a:lnSpc>
-                <a:spcPct val="93000"/>
-              </a:lnSpc>
-              <a:buClr>
-                <a:srgbClr val="000000"/>
-              </a:buClr>
-              <a:buSzPct val="100000"/>
-              <a:buFont typeface="Times New Roman" charset="0"/>
-              <a:buNone/>
-              <a:defRPr/>
-            </a:pPr>
-            <a:r>
-              <a:rPr lang="en-GB" altLang="x-none" i="1" dirty="0" smtClean="0">
-                <a:solidFill>
-                  <a:srgbClr val="666666"/>
-                </a:solidFill>
-              </a:rPr>
-              <a:t>Over 1200 models · 76 </a:t>
-            </a:r>
-            <a:r>
-              <a:rPr lang="en-GB" altLang="x-none" i="1" dirty="0">
-                <a:solidFill>
-                  <a:srgbClr val="666666"/>
-                </a:solidFill>
-              </a:rPr>
-              <a:t>simulation environments · </a:t>
-            </a:r>
-            <a:r>
-              <a:rPr lang="en-GB" altLang="x-none" i="1" dirty="0" smtClean="0">
-                <a:solidFill>
-                  <a:srgbClr val="666666"/>
-                </a:solidFill>
-              </a:rPr>
-              <a:t>178 cell types</a:t>
-            </a:r>
-            <a:r>
-              <a:rPr lang="en-GB" altLang="x-none" i="1" dirty="0">
-                <a:solidFill>
-                  <a:srgbClr val="666666"/>
-                </a:solidFill>
-              </a:rPr>
-              <a:t> · </a:t>
-            </a:r>
-            <a:r>
-              <a:rPr lang="en-GB" altLang="x-none" i="1" dirty="0" smtClean="0">
-                <a:solidFill>
-                  <a:srgbClr val="666666"/>
-                </a:solidFill>
-              </a:rPr>
-              <a:t>145 topics (Alzheimer’s, STDP, </a:t>
-            </a:r>
-            <a:r>
-              <a:rPr lang="en-GB" altLang="x-none" i="1" dirty="0" err="1" smtClean="0">
-                <a:solidFill>
-                  <a:srgbClr val="666666"/>
-                </a:solidFill>
-              </a:rPr>
-              <a:t>etc</a:t>
-            </a:r>
-            <a:r>
-              <a:rPr lang="en-GB" altLang="x-none" i="1" dirty="0" smtClean="0">
-                <a:solidFill>
-                  <a:srgbClr val="666666"/>
-                </a:solidFill>
-              </a:rPr>
-              <a:t>) </a:t>
-            </a:r>
-            <a:r>
-              <a:rPr lang="en-GB" altLang="x-none" i="1" dirty="0">
-                <a:solidFill>
-                  <a:srgbClr val="666666"/>
-                </a:solidFill>
-              </a:rPr>
-              <a:t>· </a:t>
-            </a:r>
-            <a:r>
-              <a:rPr lang="en-GB" altLang="x-none" i="1" dirty="0" smtClean="0">
-                <a:solidFill>
-                  <a:srgbClr val="666666"/>
-                </a:solidFill>
-              </a:rPr>
-              <a:t>16+ species</a:t>
-            </a:r>
-            <a:r>
-              <a:rPr lang="en-GB" altLang="x-none" i="1" dirty="0">
-                <a:solidFill>
-                  <a:srgbClr val="666666"/>
-                </a:solidFill>
-              </a:rPr>
-              <a:t> · </a:t>
-            </a:r>
-            <a:r>
-              <a:rPr lang="en-GB" altLang="x-none" i="1" dirty="0" smtClean="0">
-                <a:solidFill>
-                  <a:srgbClr val="666666"/>
-                </a:solidFill>
-              </a:rPr>
-              <a:t>54 ion channels, pumps, </a:t>
-            </a:r>
-            <a:r>
-              <a:rPr lang="en-GB" altLang="x-none" i="1" dirty="0" err="1" smtClean="0">
-                <a:solidFill>
-                  <a:srgbClr val="666666"/>
-                </a:solidFill>
-              </a:rPr>
-              <a:t>etc</a:t>
-            </a:r>
-            <a:r>
-              <a:rPr lang="en-GB" altLang="x-none" i="1" dirty="0" smtClean="0">
-                <a:solidFill>
-                  <a:srgbClr val="666666"/>
-                </a:solidFill>
-              </a:rPr>
-              <a:t> </a:t>
-            </a:r>
-            <a:r>
-              <a:rPr lang="en-GB" altLang="x-none" i="1" dirty="0">
-                <a:solidFill>
-                  <a:srgbClr val="666666"/>
-                </a:solidFill>
-              </a:rPr>
-              <a:t> · </a:t>
-            </a:r>
-            <a:endParaRPr lang="en-GB" altLang="x-none" i="1" dirty="0" smtClean="0">
-              <a:solidFill>
-                <a:srgbClr val="666666"/>
-              </a:solidFill>
-            </a:endParaRPr>
-          </a:p>
-          <a:p>
-            <a:pPr algn="ctr" eaLnBrk="1">
-              <a:lnSpc>
-                <a:spcPct val="93000"/>
-              </a:lnSpc>
-              <a:buClr>
-                <a:srgbClr val="000000"/>
-              </a:buClr>
-              <a:buSzPct val="100000"/>
-              <a:buFont typeface="Times New Roman" charset="0"/>
-              <a:buNone/>
-              <a:defRPr/>
-            </a:pPr>
-            <a:r>
-              <a:rPr lang="en-GB" altLang="x-none" i="1" dirty="0" smtClean="0">
-                <a:solidFill>
-                  <a:srgbClr val="666666"/>
-                </a:solidFill>
-              </a:rPr>
-              <a:t>24+ mammalian brain regions</a:t>
-            </a:r>
-            <a:endParaRPr lang="en-GB" altLang="x-none" i="1" dirty="0" smtClean="0">
-              <a:solidFill>
-                <a:srgbClr val="666666"/>
-              </a:solidFill>
-            </a:endParaRPr>
           </a:p>
         </p:txBody>
       </p:sp>
@@ -9069,7 +8607,7 @@
             <a:r>
               <a:rPr lang="en-GB" altLang="x-none" b="1" i="1" dirty="0" smtClean="0">
                 <a:solidFill>
-                  <a:srgbClr val="808080"/>
+                  <a:schemeClr val="tx1"/>
                 </a:solidFill>
               </a:rPr>
               <a:t>Improving quantity and quality of model entries</a:t>
@@ -9077,16 +8615,11 @@
             <a:r>
               <a:rPr lang="en-GB" altLang="x-none" i="1" dirty="0" smtClean="0">
                 <a:solidFill>
-                  <a:srgbClr val="808080"/>
+                  <a:schemeClr val="tx1"/>
                 </a:solidFill>
               </a:rPr>
               <a:t> by actively identifying new modelling literature and providing NLP tools to assist entry of descriptive metadata.</a:t>
             </a:r>
-            <a:endParaRPr lang="en-GB" altLang="x-none" i="1" dirty="0" smtClean="0">
-              <a:solidFill>
-                <a:srgbClr val="808080"/>
-              </a:solidFill>
-            </a:endParaRPr>
           </a:p>
         </p:txBody>
       </p:sp>
@@ -9450,7 +8983,7 @@
             <a:r>
               <a:rPr lang="en-GB" altLang="x-none" b="1" i="1" dirty="0" smtClean="0">
                 <a:solidFill>
-                  <a:srgbClr val="808080"/>
+                  <a:schemeClr val="tx1"/>
                 </a:solidFill>
               </a:rPr>
               <a:t>Model visualization tools </a:t>
@@ -9458,16 +8991,11 @@
             <a:r>
               <a:rPr lang="en-GB" altLang="x-none" i="1" dirty="0" smtClean="0">
                 <a:solidFill>
-                  <a:srgbClr val="808080"/>
+                  <a:schemeClr val="tx1"/>
                 </a:solidFill>
               </a:rPr>
               <a:t>make models more accessible by allowing insight into the model structure without reading code.</a:t>
             </a:r>
-            <a:endParaRPr lang="en-GB" altLang="x-none" i="1" dirty="0" smtClean="0">
-              <a:solidFill>
-                <a:srgbClr val="808080"/>
-              </a:solidFill>
-            </a:endParaRPr>
           </a:p>
         </p:txBody>
       </p:sp>
@@ -9540,11 +9068,6 @@
               </a:rPr>
               <a:t> projects</a:t>
             </a:r>
-            <a:endParaRPr lang="en-GB" altLang="x-none" sz="3200" dirty="0" smtClean="0">
-              <a:solidFill>
-                <a:srgbClr val="800000"/>
-              </a:solidFill>
-            </a:endParaRPr>
           </a:p>
         </p:txBody>
       </p:sp>
@@ -9601,36 +9124,6 @@
           <a:chExt cx="0" cy="0"/>
         </a:xfrm>
       </p:grpSpPr>
-      <p:pic>
-        <p:nvPicPr>
-          <p:cNvPr id="2" name="Picture 1"/>
-          <p:cNvPicPr>
-            <a:picLocks noChangeAspect="1"/>
-          </p:cNvPicPr>
-          <p:nvPr/>
-        </p:nvPicPr>
-        <p:blipFill>
-          <a:blip r:embed="rId3">
-            <a:extLst>
-              <a:ext uri="{28A0092B-C50C-407E-A947-70E740481C1C}">
-                <a14:useLocalDpi xmlns:a14="http://schemas.microsoft.com/office/drawing/2010/main" val="0"/>
-              </a:ext>
-            </a:extLst>
-          </a:blip>
-          <a:stretch>
-            <a:fillRect/>
-          </a:stretch>
-        </p:blipFill>
-        <p:spPr>
-          <a:xfrm>
-            <a:off x="287784" y="323453"/>
-            <a:ext cx="9323656" cy="3096344"/>
-          </a:xfrm>
-          <a:prstGeom prst="rect">
-            <a:avLst/>
-          </a:prstGeom>
-        </p:spPr>
-      </p:pic>
       <p:sp>
         <p:nvSpPr>
           <p:cNvPr id="5" name="Text Box 1"/>
@@ -9939,7 +9432,7 @@
             <a:r>
               <a:rPr lang="en-GB" altLang="x-none" b="1" i="1" dirty="0" smtClean="0">
                 <a:solidFill>
-                  <a:srgbClr val="808080"/>
+                  <a:schemeClr val="tx1"/>
                 </a:solidFill>
               </a:rPr>
               <a:t>Better model context</a:t>
@@ -9947,7 +9440,7 @@
             <a:r>
               <a:rPr lang="en-GB" altLang="x-none" i="1" dirty="0" smtClean="0">
                 <a:solidFill>
-                  <a:srgbClr val="808080"/>
+                  <a:schemeClr val="tx1"/>
                 </a:solidFill>
               </a:rPr>
               <a:t> through partnerships with external </a:t>
@@ -9955,7 +9448,7 @@
             <a:r>
               <a:rPr lang="en-GB" altLang="x-none" i="1" dirty="0" err="1" smtClean="0">
                 <a:solidFill>
-                  <a:srgbClr val="808080"/>
+                  <a:schemeClr val="tx1"/>
                 </a:solidFill>
               </a:rPr>
               <a:t>neuroinformatics</a:t>
@@ -9963,7 +9456,7 @@
             <a:r>
               <a:rPr lang="en-GB" altLang="x-none" i="1" dirty="0" smtClean="0">
                 <a:solidFill>
-                  <a:srgbClr val="808080"/>
+                  <a:schemeClr val="tx1"/>
                 </a:solidFill>
               </a:rPr>
               <a:t> resources like the Ion Channel Genealogy (above) and through identifying repeated patterns within </a:t>
@@ -9971,7 +9464,7 @@
             <a:r>
               <a:rPr lang="en-GB" altLang="x-none" i="1" dirty="0" err="1" smtClean="0">
                 <a:solidFill>
-                  <a:srgbClr val="808080"/>
+                  <a:schemeClr val="tx1"/>
                 </a:solidFill>
               </a:rPr>
               <a:t>ModelDB</a:t>
@@ -9979,19 +9472,1142 @@
             <a:r>
               <a:rPr lang="en-GB" altLang="x-none" i="1" dirty="0" smtClean="0">
                 <a:solidFill>
-                  <a:srgbClr val="808080"/>
+                  <a:schemeClr val="tx1"/>
                 </a:solidFill>
               </a:rPr>
               <a:t> itself (right).</a:t>
             </a:r>
-            <a:endParaRPr lang="en-GB" altLang="x-none" i="1" dirty="0" smtClean="0">
-              <a:solidFill>
-                <a:srgbClr val="808080"/>
-              </a:solidFill>
-            </a:endParaRPr>
           </a:p>
         </p:txBody>
       </p:sp>
+      <p:sp>
+        <p:nvSpPr>
+          <p:cNvPr id="4" name="Rectangle 1"/>
+          <p:cNvSpPr>
+            <a:spLocks noChangeArrowheads="1"/>
+          </p:cNvSpPr>
+          <p:nvPr/>
+        </p:nvSpPr>
+        <p:spPr bwMode="auto">
+          <a:xfrm>
+            <a:off x="5952752" y="138499"/>
+            <a:ext cx="4104208" cy="3532996"/>
+          </a:xfrm>
+          <a:prstGeom prst="rect">
+            <a:avLst/>
+          </a:prstGeom>
+          <a:solidFill>
+            <a:srgbClr val="FFFFFF"/>
+          </a:solidFill>
+          <a:ln>
+            <a:noFill/>
+          </a:ln>
+          <a:effectLst/>
+          <a:extLst>
+            <a:ext uri="{91240B29-F687-4F45-9708-019B960494DF}">
+              <a14:hiddenLine xmlns:a14="http://schemas.microsoft.com/office/drawing/2010/main" w="9525">
+                <a:solidFill>
+                  <a:schemeClr val="tx1"/>
+                </a:solidFill>
+                <a:miter lim="800000"/>
+                <a:headEnd/>
+                <a:tailEnd/>
+              </a14:hiddenLine>
+            </a:ext>
+            <a:ext uri="{AF507438-7753-43E0-B8FC-AC1667EBCBE1}">
+              <a14:hiddenEffects xmlns:a14="http://schemas.microsoft.com/office/drawing/2010/main">
+                <a:effectLst>
+                  <a:outerShdw dist="35921" dir="2700000" algn="ctr" rotWithShape="0">
+                    <a:schemeClr val="bg2"/>
+                  </a:outerShdw>
+                </a:effectLst>
+              </a14:hiddenEffects>
+            </a:ext>
+          </a:extLst>
+        </p:spPr>
+        <p:txBody>
+          <a:bodyPr vert="horz" wrap="square" lIns="91440" tIns="0" rIns="91440" bIns="69828" numCol="1" anchor="ctr" anchorCtr="0" compatLnSpc="1">
+            <a:prstTxWarp prst="textNoShape">
+              <a:avLst/>
+            </a:prstTxWarp>
+            <a:spAutoFit/>
+          </a:bodyPr>
+          <a:lstStyle/>
+          <a:p>
+            <a:pPr marL="0" marR="0" lvl="0" indent="0" algn="l" defTabSz="914400" rtl="0" eaLnBrk="0" fontAlgn="base" latinLnBrk="0" hangingPunct="0">
+              <a:lnSpc>
+                <a:spcPct val="100000"/>
+              </a:lnSpc>
+              <a:spcBef>
+                <a:spcPct val="0"/>
+              </a:spcBef>
+              <a:spcAft>
+                <a:spcPct val="0"/>
+              </a:spcAft>
+              <a:buClrTx/>
+              <a:buSzTx/>
+              <a:buFontTx/>
+              <a:buNone/>
+              <a:tabLst/>
+            </a:pPr>
+            <a:r>
+              <a:rPr kumimoji="0" lang="en-US" altLang="en-US" sz="1200" b="0" i="0" u="none" strike="noStrike" cap="none" normalizeH="0" baseline="0" dirty="0" smtClean="0">
+                <a:ln>
+                  <a:noFill/>
+                </a:ln>
+                <a:solidFill>
+                  <a:srgbClr val="333333"/>
+                </a:solidFill>
+                <a:effectLst/>
+                <a:latin typeface="Helvetica Neue"/>
+              </a:rPr>
+              <a:t>General data</a:t>
+            </a:r>
+          </a:p>
+          <a:p>
+            <a:pPr marL="0" marR="0" lvl="0" indent="0" algn="l" defTabSz="914400" rtl="0" eaLnBrk="0" fontAlgn="base" latinLnBrk="0" hangingPunct="0">
+              <a:lnSpc>
+                <a:spcPct val="100000"/>
+              </a:lnSpc>
+              <a:spcBef>
+                <a:spcPct val="0"/>
+              </a:spcBef>
+              <a:spcAft>
+                <a:spcPct val="0"/>
+              </a:spcAft>
+              <a:buClrTx/>
+              <a:buSzTx/>
+              <a:buFontTx/>
+              <a:buChar char="•"/>
+              <a:tabLst/>
+            </a:pPr>
+            <a:r>
+              <a:rPr kumimoji="0" lang="en-US" altLang="en-US" sz="900" b="1" i="0" u="none" strike="noStrike" cap="none" normalizeH="0" baseline="0" dirty="0" smtClean="0">
+                <a:ln>
+                  <a:noFill/>
+                </a:ln>
+                <a:solidFill>
+                  <a:srgbClr val="333333"/>
+                </a:solidFill>
+                <a:effectLst/>
+                <a:latin typeface="Helvetica Neue"/>
+              </a:rPr>
+              <a:t> ICG id:</a:t>
+            </a:r>
+            <a:r>
+              <a:rPr kumimoji="0" lang="en-US" altLang="en-US" sz="900" b="0" i="0" u="none" strike="noStrike" cap="none" normalizeH="0" baseline="0" dirty="0" smtClean="0">
+                <a:ln>
+                  <a:noFill/>
+                </a:ln>
+                <a:solidFill>
+                  <a:srgbClr val="333333"/>
+                </a:solidFill>
+                <a:effectLst/>
+                <a:latin typeface="Helvetica Neue"/>
+              </a:rPr>
+              <a:t> 2464</a:t>
+            </a:r>
+          </a:p>
+          <a:p>
+            <a:pPr marL="0" marR="0" lvl="0" indent="0" algn="l" defTabSz="914400" rtl="0" eaLnBrk="0" fontAlgn="base" latinLnBrk="0" hangingPunct="0">
+              <a:lnSpc>
+                <a:spcPct val="100000"/>
+              </a:lnSpc>
+              <a:spcBef>
+                <a:spcPct val="0"/>
+              </a:spcBef>
+              <a:spcAft>
+                <a:spcPct val="0"/>
+              </a:spcAft>
+              <a:buClrTx/>
+              <a:buSzTx/>
+              <a:buFontTx/>
+              <a:buChar char="•"/>
+              <a:tabLst/>
+            </a:pPr>
+            <a:r>
+              <a:rPr kumimoji="0" lang="en-US" altLang="en-US" sz="900" b="1" i="0" u="none" strike="noStrike" cap="none" normalizeH="0" baseline="0" dirty="0" smtClean="0">
+                <a:ln>
+                  <a:noFill/>
+                </a:ln>
+                <a:solidFill>
+                  <a:srgbClr val="333333"/>
+                </a:solidFill>
+                <a:effectLst/>
+                <a:latin typeface="Helvetica Neue"/>
+              </a:rPr>
+              <a:t> </a:t>
+            </a:r>
+            <a:r>
+              <a:rPr kumimoji="0" lang="en-US" altLang="en-US" sz="900" b="1" i="0" u="none" strike="noStrike" cap="none" normalizeH="0" baseline="0" dirty="0" err="1" smtClean="0">
+                <a:ln>
+                  <a:noFill/>
+                </a:ln>
+                <a:solidFill>
+                  <a:srgbClr val="333333"/>
+                </a:solidFill>
+                <a:effectLst/>
+                <a:latin typeface="Helvetica Neue"/>
+              </a:rPr>
+              <a:t>ModelDB</a:t>
+            </a:r>
+            <a:r>
+              <a:rPr kumimoji="0" lang="en-US" altLang="en-US" sz="900" b="1" i="0" u="none" strike="noStrike" cap="none" normalizeH="0" baseline="0" dirty="0" smtClean="0">
+                <a:ln>
+                  <a:noFill/>
+                </a:ln>
+                <a:solidFill>
+                  <a:srgbClr val="333333"/>
+                </a:solidFill>
+                <a:effectLst/>
+                <a:latin typeface="Helvetica Neue"/>
+              </a:rPr>
+              <a:t> id:</a:t>
+            </a:r>
+            <a:r>
+              <a:rPr kumimoji="0" lang="en-US" altLang="en-US" sz="900" b="0" i="0" u="none" strike="noStrike" cap="none" normalizeH="0" baseline="0" dirty="0" smtClean="0">
+                <a:ln>
+                  <a:noFill/>
+                </a:ln>
+                <a:solidFill>
+                  <a:srgbClr val="333333"/>
+                </a:solidFill>
+                <a:effectLst/>
+                <a:latin typeface="Helvetica Neue"/>
+              </a:rPr>
+              <a:t> </a:t>
+            </a:r>
+            <a:r>
+              <a:rPr kumimoji="0" lang="en-US" altLang="en-US" sz="900" b="0" i="0" u="none" strike="noStrike" cap="none" normalizeH="0" baseline="0" dirty="0" smtClean="0">
+                <a:ln>
+                  <a:noFill/>
+                </a:ln>
+                <a:solidFill>
+                  <a:srgbClr val="337AB7"/>
+                </a:solidFill>
+                <a:effectLst/>
+                <a:latin typeface="Helvetica Neue"/>
+                <a:hlinkClick r:id="rId3"/>
+              </a:rPr>
+              <a:t>87284</a:t>
+            </a:r>
+            <a:endParaRPr kumimoji="0" lang="en-US" altLang="en-US" sz="900" b="0" i="0" u="none" strike="noStrike" cap="none" normalizeH="0" baseline="0" dirty="0" smtClean="0">
+              <a:ln>
+                <a:noFill/>
+              </a:ln>
+              <a:solidFill>
+                <a:srgbClr val="333333"/>
+              </a:solidFill>
+              <a:effectLst/>
+              <a:latin typeface="Helvetica Neue"/>
+            </a:endParaRPr>
+          </a:p>
+          <a:p>
+            <a:pPr marL="0" marR="0" lvl="0" indent="0" algn="l" defTabSz="914400" rtl="0" eaLnBrk="0" fontAlgn="base" latinLnBrk="0" hangingPunct="0">
+              <a:lnSpc>
+                <a:spcPct val="100000"/>
+              </a:lnSpc>
+              <a:spcBef>
+                <a:spcPct val="0"/>
+              </a:spcBef>
+              <a:spcAft>
+                <a:spcPct val="0"/>
+              </a:spcAft>
+              <a:buClrTx/>
+              <a:buSzTx/>
+              <a:buFontTx/>
+              <a:buChar char="•"/>
+              <a:tabLst/>
+            </a:pPr>
+            <a:r>
+              <a:rPr kumimoji="0" lang="en-US" altLang="en-US" sz="900" b="1" i="0" u="none" strike="noStrike" cap="none" normalizeH="0" baseline="0" dirty="0" smtClean="0">
+                <a:ln>
+                  <a:noFill/>
+                </a:ln>
+                <a:solidFill>
+                  <a:srgbClr val="333333"/>
+                </a:solidFill>
+                <a:effectLst/>
+                <a:latin typeface="Helvetica Neue"/>
+              </a:rPr>
+              <a:t> Reference:</a:t>
+            </a:r>
+            <a:r>
+              <a:rPr kumimoji="0" lang="en-US" altLang="en-US" sz="900" b="0" i="0" u="none" strike="noStrike" cap="none" normalizeH="0" baseline="0" dirty="0" smtClean="0">
+                <a:ln>
+                  <a:noFill/>
+                </a:ln>
+                <a:solidFill>
+                  <a:srgbClr val="333333"/>
+                </a:solidFill>
+                <a:effectLst/>
+                <a:latin typeface="Helvetica Neue"/>
+              </a:rPr>
+              <a:t> </a:t>
+            </a:r>
+            <a:r>
+              <a:rPr kumimoji="0" lang="en-US" altLang="en-US" sz="900" b="0" i="1" u="none" strike="noStrike" cap="none" normalizeH="0" baseline="0" dirty="0" smtClean="0">
+                <a:ln>
+                  <a:noFill/>
+                </a:ln>
+                <a:solidFill>
+                  <a:srgbClr val="333333"/>
+                </a:solidFill>
+                <a:effectLst/>
+                <a:latin typeface="Helvetica Neue"/>
+              </a:rPr>
+              <a:t>Morse TM, Carnevale NT, </a:t>
+            </a:r>
+            <a:r>
+              <a:rPr kumimoji="0" lang="en-US" altLang="en-US" sz="900" b="0" i="1" u="none" strike="noStrike" cap="none" normalizeH="0" baseline="0" dirty="0" err="1" smtClean="0">
+                <a:ln>
+                  <a:noFill/>
+                </a:ln>
+                <a:solidFill>
+                  <a:srgbClr val="333333"/>
+                </a:solidFill>
+                <a:effectLst/>
+                <a:latin typeface="Helvetica Neue"/>
+              </a:rPr>
+              <a:t>Mutalik</a:t>
+            </a:r>
+            <a:r>
+              <a:rPr kumimoji="0" lang="en-US" altLang="en-US" sz="900" b="0" i="1" u="none" strike="noStrike" cap="none" normalizeH="0" baseline="0" dirty="0" smtClean="0">
+                <a:ln>
+                  <a:noFill/>
+                </a:ln>
+                <a:solidFill>
+                  <a:srgbClr val="333333"/>
+                </a:solidFill>
+                <a:effectLst/>
+                <a:latin typeface="Helvetica Neue"/>
+              </a:rPr>
+              <a:t> PG, Migliore M, Shepherd GM (2010)</a:t>
+            </a:r>
+            <a:r>
+              <a:rPr kumimoji="0" lang="en-US" altLang="en-US" sz="900" b="0" i="0" u="none" strike="noStrike" cap="none" normalizeH="0" baseline="0" dirty="0" smtClean="0">
+                <a:ln>
+                  <a:noFill/>
+                </a:ln>
+                <a:solidFill>
+                  <a:srgbClr val="333333"/>
+                </a:solidFill>
+                <a:effectLst/>
+                <a:latin typeface="Helvetica Neue"/>
+              </a:rPr>
+              <a:t>: </a:t>
+            </a:r>
+            <a:r>
+              <a:rPr kumimoji="0" lang="en-US" altLang="en-US" sz="900" b="0" i="0" u="none" strike="noStrike" cap="none" normalizeH="0" baseline="0" dirty="0" smtClean="0">
+                <a:ln>
+                  <a:noFill/>
+                </a:ln>
+                <a:solidFill>
+                  <a:srgbClr val="337AB7"/>
+                </a:solidFill>
+                <a:effectLst/>
+                <a:latin typeface="Helvetica Neue"/>
+                <a:hlinkClick r:id="rId4"/>
+              </a:rPr>
+              <a:t>Abnormal Excitability of Oblique Dendrites Implicated in Early Alzheimer's: A Computational Study.</a:t>
+            </a:r>
+            <a:endParaRPr kumimoji="0" lang="en-US" altLang="en-US" sz="900" b="0" i="0" u="none" strike="noStrike" cap="none" normalizeH="0" baseline="0" dirty="0" smtClean="0">
+              <a:ln>
+                <a:noFill/>
+              </a:ln>
+              <a:solidFill>
+                <a:srgbClr val="333333"/>
+              </a:solidFill>
+              <a:effectLst/>
+              <a:latin typeface="Helvetica Neue"/>
+            </a:endParaRPr>
+          </a:p>
+          <a:p>
+            <a:pPr marL="0" marR="0" lvl="0" indent="0" algn="l" defTabSz="914400" rtl="0" eaLnBrk="0" fontAlgn="base" latinLnBrk="0" hangingPunct="0">
+              <a:lnSpc>
+                <a:spcPct val="100000"/>
+              </a:lnSpc>
+              <a:spcBef>
+                <a:spcPct val="0"/>
+              </a:spcBef>
+              <a:spcAft>
+                <a:spcPct val="0"/>
+              </a:spcAft>
+              <a:buClrTx/>
+              <a:buSzTx/>
+              <a:buFontTx/>
+              <a:buNone/>
+              <a:tabLst/>
+            </a:pPr>
+            <a:endParaRPr kumimoji="0" lang="en-US" altLang="en-US" sz="900" b="0" i="0" u="none" strike="noStrike" cap="none" normalizeH="0" baseline="0" dirty="0" smtClean="0">
+              <a:ln>
+                <a:noFill/>
+              </a:ln>
+              <a:solidFill>
+                <a:srgbClr val="333333"/>
+              </a:solidFill>
+              <a:effectLst/>
+              <a:latin typeface="Helvetica Neue"/>
+            </a:endParaRPr>
+          </a:p>
+          <a:p>
+            <a:pPr marL="0" marR="0" lvl="0" indent="0" algn="l" defTabSz="914400" rtl="0" eaLnBrk="0" fontAlgn="base" latinLnBrk="0" hangingPunct="0">
+              <a:lnSpc>
+                <a:spcPct val="100000"/>
+              </a:lnSpc>
+              <a:spcBef>
+                <a:spcPct val="0"/>
+              </a:spcBef>
+              <a:spcAft>
+                <a:spcPct val="0"/>
+              </a:spcAft>
+              <a:buClrTx/>
+              <a:buSzTx/>
+              <a:buFontTx/>
+              <a:buNone/>
+              <a:tabLst/>
+            </a:pPr>
+            <a:r>
+              <a:rPr kumimoji="0" lang="en-US" altLang="en-US" sz="1200" b="0" i="0" u="none" strike="noStrike" cap="none" normalizeH="0" baseline="0" dirty="0" smtClean="0">
+                <a:ln>
+                  <a:noFill/>
+                </a:ln>
+                <a:solidFill>
+                  <a:srgbClr val="333333"/>
+                </a:solidFill>
+                <a:effectLst/>
+                <a:latin typeface="Helvetica Neue"/>
+              </a:rPr>
+              <a:t>Metadata</a:t>
+            </a:r>
+            <a:r>
+              <a:rPr kumimoji="0" lang="en-US" altLang="en-US" sz="900" b="0" i="0" u="none" strike="noStrike" cap="none" normalizeH="0" baseline="0" dirty="0" smtClean="0">
+                <a:ln>
+                  <a:noFill/>
+                </a:ln>
+                <a:solidFill>
+                  <a:srgbClr val="333333"/>
+                </a:solidFill>
+                <a:effectLst/>
+                <a:latin typeface="Helvetica Neue"/>
+              </a:rPr>
+              <a:t> </a:t>
+            </a:r>
+            <a:r>
+              <a:rPr kumimoji="0" lang="en-US" altLang="en-US" sz="900" b="0" i="0" u="none" strike="noStrike" cap="none" normalizeH="0" baseline="0" dirty="0" smtClean="0">
+                <a:ln>
+                  <a:noFill/>
+                </a:ln>
+                <a:solidFill>
+                  <a:srgbClr val="777777"/>
+                </a:solidFill>
+                <a:effectLst/>
+                <a:latin typeface="Helvetica Neue"/>
+              </a:rPr>
+              <a:t>classes</a:t>
+            </a:r>
+            <a:endParaRPr kumimoji="0" lang="en-US" altLang="en-US" sz="900" b="0" i="0" u="none" strike="noStrike" cap="none" normalizeH="0" baseline="0" dirty="0" smtClean="0">
+              <a:ln>
+                <a:noFill/>
+              </a:ln>
+              <a:solidFill>
+                <a:srgbClr val="333333"/>
+              </a:solidFill>
+              <a:effectLst/>
+              <a:latin typeface="Helvetica Neue"/>
+            </a:endParaRPr>
+          </a:p>
+          <a:p>
+            <a:pPr marL="0" marR="0" lvl="0" indent="0" algn="l" defTabSz="914400" rtl="0" eaLnBrk="0" fontAlgn="base" latinLnBrk="0" hangingPunct="0">
+              <a:lnSpc>
+                <a:spcPct val="100000"/>
+              </a:lnSpc>
+              <a:spcBef>
+                <a:spcPct val="0"/>
+              </a:spcBef>
+              <a:spcAft>
+                <a:spcPct val="0"/>
+              </a:spcAft>
+              <a:buClrTx/>
+              <a:buSzTx/>
+              <a:buFontTx/>
+              <a:buChar char="•"/>
+              <a:tabLst/>
+            </a:pPr>
+            <a:r>
+              <a:rPr kumimoji="0" lang="en-US" altLang="en-US" sz="900" b="1" i="0" u="none" strike="noStrike" cap="none" normalizeH="0" baseline="0" dirty="0" smtClean="0">
+                <a:ln>
+                  <a:noFill/>
+                </a:ln>
+                <a:solidFill>
+                  <a:srgbClr val="333333"/>
+                </a:solidFill>
+                <a:effectLst/>
+                <a:latin typeface="Helvetica Neue"/>
+              </a:rPr>
+              <a:t> Animal Model:</a:t>
+            </a:r>
+            <a:r>
+              <a:rPr kumimoji="0" lang="en-US" altLang="en-US" sz="900" b="0" i="0" u="none" strike="noStrike" cap="none" normalizeH="0" baseline="0" dirty="0" smtClean="0">
+                <a:ln>
+                  <a:noFill/>
+                </a:ln>
+                <a:solidFill>
+                  <a:srgbClr val="333333"/>
+                </a:solidFill>
+                <a:effectLst/>
+                <a:latin typeface="Helvetica Neue"/>
+              </a:rPr>
+              <a:t> rat </a:t>
+            </a:r>
+          </a:p>
+          <a:p>
+            <a:pPr marL="0" marR="0" lvl="0" indent="0" algn="l" defTabSz="914400" rtl="0" eaLnBrk="0" fontAlgn="base" latinLnBrk="0" hangingPunct="0">
+              <a:lnSpc>
+                <a:spcPct val="100000"/>
+              </a:lnSpc>
+              <a:spcBef>
+                <a:spcPct val="0"/>
+              </a:spcBef>
+              <a:spcAft>
+                <a:spcPct val="0"/>
+              </a:spcAft>
+              <a:buClrTx/>
+              <a:buSzTx/>
+              <a:buFontTx/>
+              <a:buChar char="•"/>
+              <a:tabLst/>
+            </a:pPr>
+            <a:r>
+              <a:rPr kumimoji="0" lang="en-US" altLang="en-US" sz="900" b="1" i="0" u="none" strike="noStrike" cap="none" normalizeH="0" baseline="0" dirty="0" smtClean="0">
+                <a:ln>
+                  <a:noFill/>
+                </a:ln>
+                <a:solidFill>
+                  <a:srgbClr val="333333"/>
+                </a:solidFill>
+                <a:effectLst/>
+                <a:latin typeface="Helvetica Neue"/>
+              </a:rPr>
+              <a:t> Brain Area:</a:t>
+            </a:r>
+            <a:r>
+              <a:rPr kumimoji="0" lang="en-US" altLang="en-US" sz="900" b="0" i="0" u="none" strike="noStrike" cap="none" normalizeH="0" baseline="0" dirty="0" smtClean="0">
+                <a:ln>
+                  <a:noFill/>
+                </a:ln>
+                <a:solidFill>
+                  <a:srgbClr val="333333"/>
+                </a:solidFill>
+                <a:effectLst/>
+                <a:latin typeface="Helvetica Neue"/>
+              </a:rPr>
+              <a:t> hippocampus, CA1</a:t>
+            </a:r>
+          </a:p>
+          <a:p>
+            <a:pPr marL="0" marR="0" lvl="0" indent="0" algn="l" defTabSz="914400" rtl="0" eaLnBrk="0" fontAlgn="base" latinLnBrk="0" hangingPunct="0">
+              <a:lnSpc>
+                <a:spcPct val="100000"/>
+              </a:lnSpc>
+              <a:spcBef>
+                <a:spcPct val="0"/>
+              </a:spcBef>
+              <a:spcAft>
+                <a:spcPct val="0"/>
+              </a:spcAft>
+              <a:buClrTx/>
+              <a:buSzTx/>
+              <a:buFontTx/>
+              <a:buChar char="•"/>
+              <a:tabLst/>
+            </a:pPr>
+            <a:r>
+              <a:rPr kumimoji="0" lang="en-US" altLang="en-US" sz="900" b="1" i="0" u="none" strike="noStrike" cap="none" normalizeH="0" baseline="0" dirty="0" smtClean="0">
+                <a:ln>
+                  <a:noFill/>
+                </a:ln>
+                <a:solidFill>
+                  <a:srgbClr val="333333"/>
+                </a:solidFill>
+                <a:effectLst/>
+                <a:latin typeface="Helvetica Neue"/>
+              </a:rPr>
+              <a:t> Neuron Region:</a:t>
+            </a:r>
+            <a:r>
+              <a:rPr kumimoji="0" lang="en-US" altLang="en-US" sz="900" b="0" i="0" u="none" strike="noStrike" cap="none" normalizeH="0" baseline="0" dirty="0" smtClean="0">
+                <a:ln>
+                  <a:noFill/>
+                </a:ln>
+                <a:solidFill>
+                  <a:srgbClr val="333333"/>
+                </a:solidFill>
+                <a:effectLst/>
+                <a:latin typeface="Helvetica Neue"/>
+              </a:rPr>
+              <a:t> unspecified</a:t>
+            </a:r>
+          </a:p>
+          <a:p>
+            <a:pPr marL="0" marR="0" lvl="0" indent="0" algn="l" defTabSz="914400" rtl="0" eaLnBrk="0" fontAlgn="base" latinLnBrk="0" hangingPunct="0">
+              <a:lnSpc>
+                <a:spcPct val="100000"/>
+              </a:lnSpc>
+              <a:spcBef>
+                <a:spcPct val="0"/>
+              </a:spcBef>
+              <a:spcAft>
+                <a:spcPct val="0"/>
+              </a:spcAft>
+              <a:buClrTx/>
+              <a:buSzTx/>
+              <a:buFontTx/>
+              <a:buChar char="•"/>
+              <a:tabLst/>
+            </a:pPr>
+            <a:r>
+              <a:rPr kumimoji="0" lang="en-US" altLang="en-US" sz="900" b="1" i="0" u="none" strike="noStrike" cap="none" normalizeH="0" baseline="0" dirty="0" smtClean="0">
+                <a:ln>
+                  <a:noFill/>
+                </a:ln>
+                <a:solidFill>
+                  <a:srgbClr val="333333"/>
+                </a:solidFill>
+                <a:effectLst/>
+                <a:latin typeface="Helvetica Neue"/>
+              </a:rPr>
+              <a:t> Neuron Type:</a:t>
+            </a:r>
+            <a:r>
+              <a:rPr kumimoji="0" lang="en-US" altLang="en-US" sz="900" b="0" i="0" u="none" strike="noStrike" cap="none" normalizeH="0" baseline="0" dirty="0" smtClean="0">
+                <a:ln>
+                  <a:noFill/>
+                </a:ln>
+                <a:solidFill>
+                  <a:srgbClr val="333333"/>
+                </a:solidFill>
+                <a:effectLst/>
+                <a:latin typeface="Helvetica Neue"/>
+              </a:rPr>
+              <a:t> pyramidal cell</a:t>
+            </a:r>
+          </a:p>
+          <a:p>
+            <a:pPr marL="0" marR="0" lvl="0" indent="0" algn="l" defTabSz="914400" rtl="0" eaLnBrk="0" fontAlgn="base" latinLnBrk="0" hangingPunct="0">
+              <a:lnSpc>
+                <a:spcPct val="100000"/>
+              </a:lnSpc>
+              <a:spcBef>
+                <a:spcPct val="0"/>
+              </a:spcBef>
+              <a:spcAft>
+                <a:spcPct val="0"/>
+              </a:spcAft>
+              <a:buClrTx/>
+              <a:buSzTx/>
+              <a:buFontTx/>
+              <a:buChar char="•"/>
+              <a:tabLst/>
+            </a:pPr>
+            <a:r>
+              <a:rPr kumimoji="0" lang="en-US" altLang="en-US" sz="900" b="1" i="0" u="none" strike="noStrike" cap="none" normalizeH="0" baseline="0" dirty="0" smtClean="0">
+                <a:ln>
+                  <a:noFill/>
+                </a:ln>
+                <a:solidFill>
+                  <a:srgbClr val="333333"/>
+                </a:solidFill>
+                <a:effectLst/>
+                <a:latin typeface="Helvetica Neue"/>
+              </a:rPr>
+              <a:t> Runtime Q:</a:t>
+            </a:r>
+            <a:r>
+              <a:rPr kumimoji="0" lang="en-US" altLang="en-US" sz="900" b="0" i="0" u="none" strike="noStrike" cap="none" normalizeH="0" baseline="0" dirty="0" smtClean="0">
+                <a:ln>
+                  <a:noFill/>
+                </a:ln>
+                <a:solidFill>
+                  <a:srgbClr val="333333"/>
+                </a:solidFill>
+                <a:effectLst/>
+                <a:latin typeface="Helvetica Neue"/>
+              </a:rPr>
+              <a:t> Q4 (slow)</a:t>
+            </a:r>
+          </a:p>
+          <a:p>
+            <a:pPr marL="0" marR="0" lvl="0" indent="0" algn="l" defTabSz="914400" rtl="0" eaLnBrk="0" fontAlgn="base" latinLnBrk="0" hangingPunct="0">
+              <a:lnSpc>
+                <a:spcPct val="100000"/>
+              </a:lnSpc>
+              <a:spcBef>
+                <a:spcPct val="0"/>
+              </a:spcBef>
+              <a:spcAft>
+                <a:spcPct val="0"/>
+              </a:spcAft>
+              <a:buClrTx/>
+              <a:buSzTx/>
+              <a:buFontTx/>
+              <a:buChar char="•"/>
+              <a:tabLst/>
+            </a:pPr>
+            <a:r>
+              <a:rPr kumimoji="0" lang="en-US" altLang="en-US" sz="900" b="1" i="0" u="none" strike="noStrike" cap="none" normalizeH="0" baseline="0" dirty="0" smtClean="0">
+                <a:ln>
+                  <a:noFill/>
+                </a:ln>
+                <a:solidFill>
+                  <a:srgbClr val="333333"/>
+                </a:solidFill>
+                <a:effectLst/>
+                <a:latin typeface="Helvetica Neue"/>
+              </a:rPr>
+              <a:t> Subtype:</a:t>
+            </a:r>
+            <a:r>
+              <a:rPr kumimoji="0" lang="en-US" altLang="en-US" sz="900" b="0" i="0" u="none" strike="noStrike" cap="none" normalizeH="0" baseline="0" dirty="0" smtClean="0">
+                <a:ln>
+                  <a:noFill/>
+                </a:ln>
+                <a:solidFill>
+                  <a:srgbClr val="333333"/>
+                </a:solidFill>
+                <a:effectLst/>
+                <a:latin typeface="Helvetica Neue"/>
+              </a:rPr>
+              <a:t> not specified</a:t>
+            </a:r>
+          </a:p>
+          <a:p>
+            <a:pPr marL="0" marR="0" lvl="0" indent="0" algn="l" defTabSz="914400" rtl="0" eaLnBrk="0" fontAlgn="base" latinLnBrk="0" hangingPunct="0">
+              <a:lnSpc>
+                <a:spcPct val="100000"/>
+              </a:lnSpc>
+              <a:spcBef>
+                <a:spcPct val="0"/>
+              </a:spcBef>
+              <a:spcAft>
+                <a:spcPct val="0"/>
+              </a:spcAft>
+              <a:buClrTx/>
+              <a:buSzTx/>
+              <a:buFontTx/>
+              <a:buNone/>
+              <a:tabLst/>
+            </a:pPr>
+            <a:endParaRPr kumimoji="0" lang="en-US" altLang="en-US" sz="900" b="0" i="0" u="none" strike="noStrike" cap="none" normalizeH="0" baseline="0" dirty="0" smtClean="0">
+              <a:ln>
+                <a:noFill/>
+              </a:ln>
+              <a:solidFill>
+                <a:srgbClr val="333333"/>
+              </a:solidFill>
+              <a:effectLst/>
+              <a:latin typeface="Helvetica Neue"/>
+            </a:endParaRPr>
+          </a:p>
+          <a:p>
+            <a:pPr marL="0" marR="0" lvl="0" indent="0" algn="l" defTabSz="914400" rtl="0" eaLnBrk="0" fontAlgn="base" latinLnBrk="0" hangingPunct="0">
+              <a:lnSpc>
+                <a:spcPct val="100000"/>
+              </a:lnSpc>
+              <a:spcBef>
+                <a:spcPct val="0"/>
+              </a:spcBef>
+              <a:spcAft>
+                <a:spcPct val="0"/>
+              </a:spcAft>
+              <a:buClrTx/>
+              <a:buSzTx/>
+              <a:buFontTx/>
+              <a:buNone/>
+              <a:tabLst/>
+            </a:pPr>
+            <a:r>
+              <a:rPr kumimoji="0" lang="en-US" altLang="en-US" sz="1200" b="0" i="0" u="none" strike="noStrike" cap="none" normalizeH="0" baseline="0" dirty="0" smtClean="0">
+                <a:ln>
+                  <a:noFill/>
+                </a:ln>
+                <a:solidFill>
+                  <a:srgbClr val="333333"/>
+                </a:solidFill>
+                <a:effectLst/>
+                <a:latin typeface="Helvetica Neue"/>
+              </a:rPr>
+              <a:t>Metadata</a:t>
+            </a:r>
+            <a:r>
+              <a:rPr kumimoji="0" lang="en-US" altLang="en-US" sz="900" b="0" i="0" u="none" strike="noStrike" cap="none" normalizeH="0" baseline="0" dirty="0" smtClean="0">
+                <a:ln>
+                  <a:noFill/>
+                </a:ln>
+                <a:solidFill>
+                  <a:srgbClr val="333333"/>
+                </a:solidFill>
+                <a:effectLst/>
+                <a:latin typeface="Helvetica Neue"/>
+              </a:rPr>
+              <a:t> </a:t>
+            </a:r>
+            <a:r>
+              <a:rPr kumimoji="0" lang="en-US" altLang="en-US" sz="900" b="0" i="0" u="none" strike="noStrike" cap="none" normalizeH="0" baseline="0" dirty="0" smtClean="0">
+                <a:ln>
+                  <a:noFill/>
+                </a:ln>
+                <a:solidFill>
+                  <a:srgbClr val="777777"/>
+                </a:solidFill>
+                <a:effectLst/>
+                <a:latin typeface="Helvetica Neue"/>
+              </a:rPr>
+              <a:t>generic</a:t>
+            </a:r>
+            <a:endParaRPr kumimoji="0" lang="en-US" altLang="en-US" sz="900" b="0" i="0" u="none" strike="noStrike" cap="none" normalizeH="0" baseline="0" dirty="0" smtClean="0">
+              <a:ln>
+                <a:noFill/>
+              </a:ln>
+              <a:solidFill>
+                <a:srgbClr val="333333"/>
+              </a:solidFill>
+              <a:effectLst/>
+              <a:latin typeface="Helvetica Neue"/>
+            </a:endParaRPr>
+          </a:p>
+          <a:p>
+            <a:pPr marL="0" marR="0" lvl="0" indent="0" algn="l" defTabSz="914400" rtl="0" eaLnBrk="0" fontAlgn="base" latinLnBrk="0" hangingPunct="0">
+              <a:lnSpc>
+                <a:spcPct val="100000"/>
+              </a:lnSpc>
+              <a:spcBef>
+                <a:spcPct val="0"/>
+              </a:spcBef>
+              <a:spcAft>
+                <a:spcPct val="0"/>
+              </a:spcAft>
+              <a:buClrTx/>
+              <a:buSzTx/>
+              <a:buFontTx/>
+              <a:buChar char="•"/>
+              <a:tabLst/>
+            </a:pPr>
+            <a:r>
+              <a:rPr kumimoji="0" lang="en-US" altLang="en-US" sz="900" b="1" i="0" u="none" strike="noStrike" cap="none" normalizeH="0" baseline="0" dirty="0" smtClean="0">
+                <a:ln>
+                  <a:noFill/>
+                </a:ln>
+                <a:solidFill>
+                  <a:srgbClr val="333333"/>
+                </a:solidFill>
+                <a:effectLst/>
+                <a:latin typeface="Helvetica Neue"/>
+              </a:rPr>
+              <a:t> Age:</a:t>
+            </a:r>
+            <a:r>
+              <a:rPr kumimoji="0" lang="en-US" altLang="en-US" sz="900" b="0" i="0" u="none" strike="noStrike" cap="none" normalizeH="0" baseline="0" dirty="0" smtClean="0">
+                <a:ln>
+                  <a:noFill/>
+                </a:ln>
+                <a:solidFill>
+                  <a:srgbClr val="333333"/>
+                </a:solidFill>
+                <a:effectLst/>
+                <a:latin typeface="Helvetica Neue"/>
+              </a:rPr>
+              <a:t> 7-14 weeks old.</a:t>
+            </a:r>
+          </a:p>
+          <a:p>
+            <a:pPr marL="0" marR="0" lvl="0" indent="0" algn="l" defTabSz="914400" rtl="0" eaLnBrk="0" fontAlgn="base" latinLnBrk="0" hangingPunct="0">
+              <a:lnSpc>
+                <a:spcPct val="100000"/>
+              </a:lnSpc>
+              <a:spcBef>
+                <a:spcPct val="0"/>
+              </a:spcBef>
+              <a:spcAft>
+                <a:spcPct val="0"/>
+              </a:spcAft>
+              <a:buClrTx/>
+              <a:buSzTx/>
+              <a:buFontTx/>
+              <a:buChar char="•"/>
+              <a:tabLst/>
+            </a:pPr>
+            <a:r>
+              <a:rPr kumimoji="0" lang="en-US" altLang="en-US" sz="900" b="1" i="0" u="none" strike="noStrike" cap="none" normalizeH="0" baseline="0" dirty="0" smtClean="0">
+                <a:ln>
+                  <a:noFill/>
+                </a:ln>
+                <a:solidFill>
+                  <a:srgbClr val="333333"/>
+                </a:solidFill>
+                <a:effectLst/>
+                <a:latin typeface="Helvetica Neue"/>
+              </a:rPr>
+              <a:t> Authors:</a:t>
+            </a:r>
+            <a:r>
+              <a:rPr kumimoji="0" lang="en-US" altLang="en-US" sz="900" b="0" i="0" u="none" strike="noStrike" cap="none" normalizeH="0" baseline="0" dirty="0" smtClean="0">
+                <a:ln>
+                  <a:noFill/>
+                </a:ln>
+                <a:solidFill>
+                  <a:srgbClr val="333333"/>
+                </a:solidFill>
+                <a:effectLst/>
+                <a:latin typeface="Helvetica Neue"/>
+              </a:rPr>
+              <a:t> M Migliore.</a:t>
+            </a:r>
+          </a:p>
+          <a:p>
+            <a:pPr marL="0" marR="0" lvl="0" indent="0" algn="l" defTabSz="914400" rtl="0" eaLnBrk="0" fontAlgn="base" latinLnBrk="0" hangingPunct="0">
+              <a:lnSpc>
+                <a:spcPct val="100000"/>
+              </a:lnSpc>
+              <a:spcBef>
+                <a:spcPct val="0"/>
+              </a:spcBef>
+              <a:spcAft>
+                <a:spcPct val="0"/>
+              </a:spcAft>
+              <a:buClrTx/>
+              <a:buSzTx/>
+              <a:buFontTx/>
+              <a:buChar char="•"/>
+              <a:tabLst/>
+            </a:pPr>
+            <a:r>
+              <a:rPr kumimoji="0" lang="en-US" altLang="en-US" sz="900" b="1" i="0" u="none" strike="noStrike" cap="none" normalizeH="0" baseline="0" dirty="0" smtClean="0">
+                <a:ln>
+                  <a:noFill/>
+                </a:ln>
+                <a:solidFill>
+                  <a:srgbClr val="333333"/>
+                </a:solidFill>
+                <a:effectLst/>
+                <a:latin typeface="Helvetica Neue"/>
+              </a:rPr>
+              <a:t> Comments:</a:t>
+            </a:r>
+            <a:r>
+              <a:rPr kumimoji="0" lang="en-US" altLang="en-US" sz="900" b="0" i="0" u="none" strike="noStrike" cap="none" normalizeH="0" baseline="0" dirty="0" smtClean="0">
+                <a:ln>
+                  <a:noFill/>
+                </a:ln>
+                <a:solidFill>
+                  <a:srgbClr val="333333"/>
+                </a:solidFill>
+                <a:effectLst/>
+                <a:latin typeface="Helvetica Neue"/>
+              </a:rPr>
+              <a:t> Calcium activated k channel, modified from </a:t>
+            </a:r>
+            <a:r>
+              <a:rPr kumimoji="0" lang="en-US" altLang="en-US" sz="900" b="0" i="0" u="none" strike="noStrike" cap="none" normalizeH="0" baseline="0" dirty="0" err="1" smtClean="0">
+                <a:ln>
+                  <a:noFill/>
+                </a:ln>
+                <a:solidFill>
+                  <a:srgbClr val="333333"/>
+                </a:solidFill>
+                <a:effectLst/>
+                <a:latin typeface="Helvetica Neue"/>
+              </a:rPr>
+              <a:t>moczydlowski</a:t>
+            </a:r>
+            <a:r>
+              <a:rPr kumimoji="0" lang="en-US" altLang="en-US" sz="900" b="0" i="0" u="none" strike="noStrike" cap="none" normalizeH="0" baseline="0" dirty="0" smtClean="0">
+                <a:ln>
+                  <a:noFill/>
+                </a:ln>
+                <a:solidFill>
+                  <a:srgbClr val="333333"/>
+                </a:solidFill>
+                <a:effectLst/>
+                <a:latin typeface="Helvetica Neue"/>
+              </a:rPr>
+              <a:t> and </a:t>
+            </a:r>
+            <a:r>
+              <a:rPr kumimoji="0" lang="en-US" altLang="en-US" sz="900" b="0" i="0" u="none" strike="noStrike" cap="none" normalizeH="0" baseline="0" dirty="0" err="1" smtClean="0">
+                <a:ln>
+                  <a:noFill/>
+                </a:ln>
+                <a:solidFill>
+                  <a:srgbClr val="333333"/>
+                </a:solidFill>
+                <a:effectLst/>
+                <a:latin typeface="Helvetica Neue"/>
+              </a:rPr>
+              <a:t>latorre</a:t>
+            </a:r>
+            <a:r>
+              <a:rPr kumimoji="0" lang="en-US" altLang="en-US" sz="900" b="0" i="0" u="none" strike="noStrike" cap="none" normalizeH="0" baseline="0" dirty="0" smtClean="0">
+                <a:ln>
+                  <a:noFill/>
+                </a:ln>
+                <a:solidFill>
+                  <a:srgbClr val="333333"/>
+                </a:solidFill>
+                <a:effectLst/>
+                <a:latin typeface="Helvetica Neue"/>
+              </a:rPr>
+              <a:t> (1983). From </a:t>
+            </a:r>
+            <a:r>
+              <a:rPr kumimoji="0" lang="en-US" altLang="en-US" sz="900" b="0" i="0" u="none" strike="noStrike" cap="none" normalizeH="0" baseline="0" dirty="0" err="1" smtClean="0">
+                <a:ln>
+                  <a:noFill/>
+                </a:ln>
+                <a:solidFill>
+                  <a:srgbClr val="333333"/>
+                </a:solidFill>
+                <a:effectLst/>
+                <a:latin typeface="Helvetica Neue"/>
+              </a:rPr>
+              <a:t>hemond</a:t>
+            </a:r>
+            <a:r>
+              <a:rPr kumimoji="0" lang="en-US" altLang="en-US" sz="900" b="0" i="0" u="none" strike="noStrike" cap="none" normalizeH="0" baseline="0" dirty="0" smtClean="0">
+                <a:ln>
+                  <a:noFill/>
+                </a:ln>
+                <a:solidFill>
+                  <a:srgbClr val="333333"/>
+                </a:solidFill>
+                <a:effectLst/>
+                <a:latin typeface="Helvetica Neue"/>
+              </a:rPr>
+              <a:t> et al. (2008), model no. 101629, with no changes (identical mod file). Animal model taken from </a:t>
+            </a:r>
+            <a:r>
+              <a:rPr kumimoji="0" lang="en-US" altLang="en-US" sz="900" b="0" i="0" u="none" strike="noStrike" cap="none" normalizeH="0" baseline="0" dirty="0" err="1" smtClean="0">
+                <a:ln>
+                  <a:noFill/>
+                </a:ln>
+                <a:solidFill>
+                  <a:srgbClr val="333333"/>
+                </a:solidFill>
+                <a:effectLst/>
+                <a:latin typeface="Helvetica Neue"/>
+              </a:rPr>
+              <a:t>chen</a:t>
+            </a:r>
+            <a:r>
+              <a:rPr kumimoji="0" lang="en-US" altLang="en-US" sz="900" b="0" i="0" u="none" strike="noStrike" cap="none" normalizeH="0" baseline="0" dirty="0" smtClean="0">
+                <a:ln>
+                  <a:noFill/>
+                </a:ln>
+                <a:solidFill>
+                  <a:srgbClr val="333333"/>
+                </a:solidFill>
+                <a:effectLst/>
+                <a:latin typeface="Helvetica Neue"/>
+              </a:rPr>
+              <a:t> (2005) which is used to constrain model. Channel kinetics from previous study on hippocampal pyramidal neuron (</a:t>
+            </a:r>
+            <a:r>
+              <a:rPr kumimoji="0" lang="en-US" altLang="en-US" sz="900" b="0" i="0" u="none" strike="noStrike" cap="none" normalizeH="0" baseline="0" dirty="0" err="1" smtClean="0">
+                <a:ln>
+                  <a:noFill/>
+                </a:ln>
+                <a:solidFill>
+                  <a:srgbClr val="333333"/>
+                </a:solidFill>
+                <a:effectLst/>
+                <a:latin typeface="Helvetica Neue"/>
+              </a:rPr>
+              <a:t>hemond</a:t>
+            </a:r>
+            <a:r>
+              <a:rPr kumimoji="0" lang="en-US" altLang="en-US" sz="900" b="0" i="0" u="none" strike="noStrike" cap="none" normalizeH="0" baseline="0" dirty="0" smtClean="0">
+                <a:ln>
+                  <a:noFill/>
+                </a:ln>
+                <a:solidFill>
+                  <a:srgbClr val="333333"/>
+                </a:solidFill>
+                <a:effectLst/>
+                <a:latin typeface="Helvetica Neue"/>
+              </a:rPr>
+              <a:t> et al. 2008)</a:t>
+            </a:r>
+          </a:p>
+          <a:p>
+            <a:pPr marL="0" marR="0" lvl="0" indent="0" algn="l" defTabSz="914400" rtl="0" eaLnBrk="0" fontAlgn="base" latinLnBrk="0" hangingPunct="0">
+              <a:lnSpc>
+                <a:spcPct val="100000"/>
+              </a:lnSpc>
+              <a:spcBef>
+                <a:spcPct val="0"/>
+              </a:spcBef>
+              <a:spcAft>
+                <a:spcPct val="0"/>
+              </a:spcAft>
+              <a:buClrTx/>
+              <a:buSzTx/>
+              <a:buFontTx/>
+              <a:buChar char="•"/>
+              <a:tabLst/>
+            </a:pPr>
+            <a:r>
+              <a:rPr kumimoji="0" lang="en-US" altLang="en-US" sz="900" b="1" i="0" u="none" strike="noStrike" cap="none" normalizeH="0" baseline="0" dirty="0" smtClean="0">
+                <a:ln>
+                  <a:noFill/>
+                </a:ln>
+                <a:solidFill>
+                  <a:srgbClr val="333333"/>
+                </a:solidFill>
+                <a:effectLst/>
+                <a:latin typeface="Helvetica Neue"/>
+              </a:rPr>
+              <a:t> Runtime:</a:t>
+            </a:r>
+            <a:r>
+              <a:rPr kumimoji="0" lang="en-US" altLang="en-US" sz="900" b="0" i="0" u="none" strike="noStrike" cap="none" normalizeH="0" baseline="0" dirty="0" smtClean="0">
+                <a:ln>
+                  <a:noFill/>
+                </a:ln>
+                <a:solidFill>
+                  <a:srgbClr val="333333"/>
+                </a:solidFill>
+                <a:effectLst/>
+                <a:latin typeface="Helvetica Neue"/>
+              </a:rPr>
+              <a:t> 76.722</a:t>
+            </a:r>
+          </a:p>
+        </p:txBody>
+      </p:sp>
+      <p:pic>
+        <p:nvPicPr>
+          <p:cNvPr id="7" name="Picture 6"/>
+          <p:cNvPicPr>
+            <a:picLocks noChangeAspect="1"/>
+          </p:cNvPicPr>
+          <p:nvPr/>
+        </p:nvPicPr>
+        <p:blipFill>
+          <a:blip r:embed="rId5"/>
+          <a:stretch>
+            <a:fillRect/>
+          </a:stretch>
+        </p:blipFill>
+        <p:spPr>
+          <a:xfrm>
+            <a:off x="287784" y="323453"/>
+            <a:ext cx="5493266" cy="2952328"/>
+          </a:xfrm>
+          <a:prstGeom prst="rect">
+            <a:avLst/>
+          </a:prstGeom>
+        </p:spPr>
+      </p:pic>
       <p:pic>
         <p:nvPicPr>
           <p:cNvPr id="6" name="Picture 5"/>
@@ -10001,7 +10617,7 @@
           <p:nvPr/>
         </p:nvPicPr>
         <p:blipFill rotWithShape="1">
-          <a:blip r:embed="rId4"/>
+          <a:blip r:embed="rId6"/>
           <a:srcRect t="1949"/>
           <a:stretch/>
         </p:blipFill>
@@ -10015,6 +10631,69 @@
           </a:prstGeom>
         </p:spPr>
       </p:pic>
+      <p:sp>
+        <p:nvSpPr>
+          <p:cNvPr id="8" name="Oval 7"/>
+          <p:cNvSpPr/>
+          <p:nvPr/>
+        </p:nvSpPr>
+        <p:spPr bwMode="auto">
+          <a:xfrm>
+            <a:off x="2304008" y="683493"/>
+            <a:ext cx="1152128" cy="360040"/>
+          </a:xfrm>
+          <a:prstGeom prst="ellipse">
+            <a:avLst/>
+          </a:prstGeom>
+          <a:noFill/>
+          <a:ln w="38100" cap="flat" cmpd="sng" algn="ctr">
+            <a:solidFill>
+              <a:srgbClr val="FF0000"/>
+            </a:solidFill>
+            <a:prstDash val="solid"/>
+            <a:round/>
+            <a:headEnd type="none" w="med" len="med"/>
+            <a:tailEnd type="none" w="med" len="med"/>
+          </a:ln>
+          <a:effectLst/>
+          <a:extLst/>
+        </p:spPr>
+        <p:txBody>
+          <a:bodyPr vert="horz" wrap="square" lIns="91440" tIns="45720" rIns="91440" bIns="45720" numCol="1" rtlCol="0" anchor="t" anchorCtr="0" compatLnSpc="1">
+            <a:prstTxWarp prst="textNoShape">
+              <a:avLst/>
+            </a:prstTxWarp>
+          </a:bodyPr>
+          <a:lstStyle/>
+          <a:p>
+            <a:pPr marL="0" marR="0" indent="0" algn="l" defTabSz="449263" rtl="0" eaLnBrk="1" fontAlgn="base" latinLnBrk="0" hangingPunct="0">
+              <a:lnSpc>
+                <a:spcPct val="93000"/>
+              </a:lnSpc>
+              <a:spcBef>
+                <a:spcPct val="0"/>
+              </a:spcBef>
+              <a:spcAft>
+                <a:spcPct val="0"/>
+              </a:spcAft>
+              <a:buClr>
+                <a:srgbClr val="000000"/>
+              </a:buClr>
+              <a:buSzPct val="100000"/>
+              <a:buFont typeface="Times New Roman" charset="0"/>
+              <a:buNone/>
+              <a:tabLst/>
+            </a:pPr>
+            <a:endParaRPr kumimoji="0" lang="en-US" sz="1800" b="0" i="0" u="none" strike="noStrike" cap="none" normalizeH="0" baseline="0">
+              <a:ln>
+                <a:noFill/>
+              </a:ln>
+              <a:effectLst/>
+              <a:latin typeface="Arial" charset="0"/>
+            </a:endParaRPr>
+          </a:p>
+        </p:txBody>
+      </p:sp>
     </p:spTree>
   </p:cSld>
   <p:clrMapOvr>

</xml_diff>